<commit_message>
Added Course Materials - Day 5
</commit_message>
<xml_diff>
--- a/2. Core Java/Day 4/Slides/8. Understanding Java Classes and Objects/understanding-java-classes-and-objects-slides.pptx
+++ b/2. Core Java/Day 4/Slides/8. Understanding Java Classes and Objects/understanding-java-classes-and-objects-slides.pptx
@@ -14615,62 +14615,14 @@
       </p:sp>
       <p:sp>
         <p:nvSpPr>
-          <p:cNvPr id="35" name="object 35"/>
-          <p:cNvSpPr/>
-          <p:nvPr/>
-        </p:nvSpPr>
-        <p:spPr>
-          <a:xfrm>
-            <a:off x="6450531" y="3919486"/>
-            <a:ext cx="694690" cy="544830"/>
-          </a:xfrm>
-          <a:custGeom>
-            <a:avLst/>
-            <a:gdLst/>
-            <a:ahLst/>
-            <a:cxnLst/>
-            <a:rect l="l" t="t" r="r" b="b"/>
-            <a:pathLst>
-              <a:path w="694690" h="544829">
-                <a:moveTo>
-                  <a:pt x="694547" y="0"/>
-                </a:moveTo>
-                <a:lnTo>
-                  <a:pt x="0" y="0"/>
-                </a:lnTo>
-                <a:lnTo>
-                  <a:pt x="0" y="544550"/>
-                </a:lnTo>
-                <a:lnTo>
-                  <a:pt x="694547" y="544550"/>
-                </a:lnTo>
-                <a:lnTo>
-                  <a:pt x="694547" y="0"/>
-                </a:lnTo>
-                <a:close/>
-              </a:path>
-            </a:pathLst>
-          </a:custGeom>
-          <a:solidFill>
-            <a:srgbClr val="171717"/>
-          </a:solidFill>
-        </p:spPr>
-        <p:txBody>
-          <a:bodyPr wrap="square" lIns="0" tIns="0" rIns="0" bIns="0" rtlCol="0"/>
-          <a:lstStyle/>
-          <a:p/>
-        </p:txBody>
-      </p:sp>
-      <p:sp>
-        <p:nvSpPr>
           <p:cNvPr id="36" name="object 36"/>
           <p:cNvSpPr txBox="1"/>
           <p:nvPr/>
         </p:nvSpPr>
         <p:spPr>
           <a:xfrm>
-            <a:off x="10026727" y="1489174"/>
-            <a:ext cx="680085" cy="340995"/>
+            <a:off x="9770110" y="1495425"/>
+            <a:ext cx="1247140" cy="340995"/>
           </a:xfrm>
           <a:prstGeom prst="rect">
             <a:avLst/>
@@ -14698,6 +14650,16 @@
                 <a:spcPts val="265"/>
               </a:spcBef>
             </a:pPr>
+            <a:r>
+              <a:rPr lang="en-US" sz="3000" spc="-1207" baseline="1000" dirty="0">
+                <a:solidFill>
+                  <a:srgbClr val="404040"/>
+                </a:solidFill>
+                <a:latin typeface="Courier New" panose="02070309020205020404"/>
+                <a:cs typeface="Courier New" panose="02070309020205020404"/>
+              </a:rPr>
+              <a:t>0</a:t>
+            </a:r>
             <a:r>
               <a:rPr sz="3000" spc="-1207" baseline="1000" dirty="0">
                 <a:solidFill>
@@ -21934,7 +21896,7 @@
         <p:spPr>
           <a:xfrm>
             <a:off x="2750353" y="4169709"/>
-            <a:ext cx="2395220" cy="464820"/>
+            <a:ext cx="2395220" cy="358140"/>
           </a:xfrm>
           <a:prstGeom prst="rect">
             <a:avLst/>
@@ -21969,6 +21931,7 @@
                 </a:solidFill>
                 <a:latin typeface="Courier New" panose="02070309020205020404"/>
                 <a:cs typeface="Courier New" panose="02070309020205020404"/>
+                <a:sym typeface="+mn-ea"/>
               </a:rPr>
               <a:t>this</a:t>
             </a:r>
@@ -21979,8 +21942,19 @@
                 </a:solidFill>
                 <a:latin typeface="Courier New" panose="02070309020205020404"/>
                 <a:cs typeface="Courier New" panose="02070309020205020404"/>
-              </a:rPr>
-              <a:t>.passengers</a:t>
+                <a:sym typeface="+mn-ea"/>
+              </a:rPr>
+              <a:t>.</a:t>
+            </a:r>
+            <a:r>
+              <a:rPr sz="2000" spc="-5" dirty="0">
+                <a:solidFill>
+                  <a:srgbClr val="FFFFFF"/>
+                </a:solidFill>
+                <a:latin typeface="Courier New" panose="02070309020205020404"/>
+                <a:cs typeface="Courier New" panose="02070309020205020404"/>
+              </a:rPr>
+              <a:t>passengers</a:t>
             </a:r>
             <a:endParaRPr sz="2000">
               <a:latin typeface="Courier New" panose="02070309020205020404"/>
@@ -26031,7 +26005,13 @@
         <p:txBody>
           <a:bodyPr wrap="square" lIns="0" tIns="0" rIns="0" bIns="0" rtlCol="0"/>
           <a:lstStyle/>
-          <a:p/>
+          <a:p>
+            <a:r>
+              <a:rPr lang="en-US"/>
+              <a:t> </a:t>
+            </a:r>
+            <a:endParaRPr lang="en-US"/>
+          </a:p>
         </p:txBody>
       </p:sp>
       <p:sp>

</xml_diff>